<commit_message>
Aggiunta slide valutazione risultati
</commit_message>
<xml_diff>
--- a/LA VERITÀ STA NEI GESTI.pptx
+++ b/LA VERITÀ STA NEI GESTI.pptx
@@ -13,6 +13,7 @@
     <p:sldId id="261" r:id="rId7"/>
     <p:sldId id="262" r:id="rId8"/>
     <p:sldId id="263" r:id="rId9"/>
+    <p:sldId id="264" r:id="rId10"/>
   </p:sldIdLst>
   <p:sldSz cx="12192000" cy="6858000"/>
   <p:notesSz cx="6858000" cy="9144000"/>
@@ -6811,6 +6812,137 @@
 </p:sld>
 </file>
 
+<file path=ppt/slides/slide9.xml><?xml version="1.0" encoding="utf-8"?>
+<p:sld xmlns:a="http://schemas.openxmlformats.org/drawingml/2006/main" xmlns:r="http://schemas.openxmlformats.org/officeDocument/2006/relationships" xmlns:p="http://schemas.openxmlformats.org/presentationml/2006/main">
+  <p:cSld>
+    <p:spTree>
+      <p:nvGrpSpPr>
+        <p:cNvPr id="1" name=""/>
+        <p:cNvGrpSpPr/>
+        <p:nvPr/>
+      </p:nvGrpSpPr>
+      <p:grpSpPr>
+        <a:xfrm>
+          <a:off x="0" y="0"/>
+          <a:ext cx="0" cy="0"/>
+          <a:chOff x="0" y="0"/>
+          <a:chExt cx="0" cy="0"/>
+        </a:xfrm>
+      </p:grpSpPr>
+      <p:sp>
+        <p:nvSpPr>
+          <p:cNvPr id="3" name="Sottotitolo 2">
+            <a:extLst>
+              <a:ext uri="{FF2B5EF4-FFF2-40B4-BE49-F238E27FC236}">
+                <a16:creationId xmlns:a16="http://schemas.microsoft.com/office/drawing/2014/main" id="{6B8B845A-3AC7-6D1F-E8D4-33815172593F}"/>
+              </a:ext>
+            </a:extLst>
+          </p:cNvPr>
+          <p:cNvSpPr>
+            <a:spLocks noGrp="1"/>
+          </p:cNvSpPr>
+          <p:nvPr>
+            <p:ph type="subTitle" idx="1"/>
+          </p:nvPr>
+        </p:nvSpPr>
+        <p:spPr/>
+        <p:txBody>
+          <a:bodyPr/>
+          <a:lstStyle/>
+          <a:p>
+            <a:endParaRPr lang="it-IT"/>
+          </a:p>
+        </p:txBody>
+      </p:sp>
+      <p:sp>
+        <p:nvSpPr>
+          <p:cNvPr id="4" name="Titolo 1">
+            <a:extLst>
+              <a:ext uri="{FF2B5EF4-FFF2-40B4-BE49-F238E27FC236}">
+                <a16:creationId xmlns:a16="http://schemas.microsoft.com/office/drawing/2014/main" id="{69C6F4FD-BA62-586A-8CC4-D399AF387611}"/>
+              </a:ext>
+            </a:extLst>
+          </p:cNvPr>
+          <p:cNvSpPr>
+            <a:spLocks noGrp="1"/>
+          </p:cNvSpPr>
+          <p:nvPr>
+            <p:ph type="ctrTitle"/>
+          </p:nvPr>
+        </p:nvSpPr>
+        <p:spPr>
+          <a:xfrm>
+            <a:off x="1464099" y="0"/>
+            <a:ext cx="10389103" cy="911833"/>
+          </a:xfrm>
+          <a:solidFill>
+            <a:schemeClr val="bg1"/>
+          </a:solidFill>
+        </p:spPr>
+        <p:txBody>
+          <a:bodyPr anchor="b">
+            <a:normAutofit fontScale="90000"/>
+          </a:bodyPr>
+          <a:lstStyle/>
+          <a:p>
+            <a:r>
+              <a:rPr lang="it-IT" sz="3200" b="1" dirty="0">
+                <a:latin typeface="Neue Haas Grotesk Text Pro" panose="020B0504020202020204" pitchFamily="34" charset="0"/>
+              </a:rPr>
+              <a:t>IMPLEMENTAZIONE DELLA MACCHINA DELLA VERITA </a:t>
+            </a:r>
+          </a:p>
+        </p:txBody>
+      </p:sp>
+      <p:sp>
+        <p:nvSpPr>
+          <p:cNvPr id="5" name="CasellaDiTesto 4">
+            <a:extLst>
+              <a:ext uri="{FF2B5EF4-FFF2-40B4-BE49-F238E27FC236}">
+                <a16:creationId xmlns:a16="http://schemas.microsoft.com/office/drawing/2014/main" id="{505BEDF1-7245-6F5E-7C2B-6167BF70B360}"/>
+              </a:ext>
+            </a:extLst>
+          </p:cNvPr>
+          <p:cNvSpPr txBox="1"/>
+          <p:nvPr/>
+        </p:nvSpPr>
+        <p:spPr>
+          <a:xfrm>
+            <a:off x="1464099" y="1050617"/>
+            <a:ext cx="8229599" cy="461665"/>
+          </a:xfrm>
+          <a:prstGeom prst="rect">
+            <a:avLst/>
+          </a:prstGeom>
+          <a:noFill/>
+        </p:spPr>
+        <p:txBody>
+          <a:bodyPr wrap="square" rtlCol="0">
+            <a:spAutoFit/>
+          </a:bodyPr>
+          <a:lstStyle/>
+          <a:p>
+            <a:pPr algn="ctr"/>
+            <a:r>
+              <a:rPr lang="it-IT" sz="2400" dirty="0"/>
+              <a:t>Valutazione dei risultati ottenuti</a:t>
+            </a:r>
+          </a:p>
+        </p:txBody>
+      </p:sp>
+    </p:spTree>
+    <p:extLst>
+      <p:ext uri="{BB962C8B-B14F-4D97-AF65-F5344CB8AC3E}">
+        <p14:creationId xmlns:p14="http://schemas.microsoft.com/office/powerpoint/2010/main" val="3753401525"/>
+      </p:ext>
+    </p:extLst>
+  </p:cSld>
+  <p:clrMapOvr>
+    <a:masterClrMapping/>
+  </p:clrMapOvr>
+</p:sld>
+</file>
+
 <file path=ppt/theme/theme1.xml><?xml version="1.0" encoding="utf-8"?>
 <a:theme xmlns:a="http://schemas.openxmlformats.org/drawingml/2006/main" name="AccentBoxVTI">
   <a:themeElements>

</xml_diff>